<commit_message>
forgot to change team store name in carddisplay.vue
</commit_message>
<xml_diff>
--- a/Presentation.pptx
+++ b/Presentation.pptx
@@ -17,10 +17,10 @@
     <p:sldId id="261" r:id="rId11"/>
     <p:sldId id="263" r:id="rId12"/>
     <p:sldId id="267" r:id="rId13"/>
-    <p:sldId id="264" r:id="rId14"/>
-    <p:sldId id="269" r:id="rId15"/>
-    <p:sldId id="272" r:id="rId16"/>
-    <p:sldId id="265" r:id="rId17"/>
+    <p:sldId id="272" r:id="rId14"/>
+    <p:sldId id="264" r:id="rId15"/>
+    <p:sldId id="265" r:id="rId16"/>
+    <p:sldId id="269" r:id="rId17"/>
     <p:sldId id="275" r:id="rId18"/>
     <p:sldId id="266" r:id="rId19"/>
     <p:sldId id="276" r:id="rId20"/>
@@ -277,7 +277,7 @@
           <a:p>
             <a:fld id="{79F87027-2F16-4A68-BA00-E2C1901732B5}" type="datetimeFigureOut">
               <a:rPr lang="en-US" smtClean="0"/>
-              <a:t>9/12/2023</a:t>
+              <a:t>9/13/2023</a:t>
             </a:fld>
             <a:endParaRPr lang="en-US"/>
           </a:p>
@@ -475,7 +475,7 @@
           <a:p>
             <a:fld id="{79F87027-2F16-4A68-BA00-E2C1901732B5}" type="datetimeFigureOut">
               <a:rPr lang="en-US" smtClean="0"/>
-              <a:t>9/12/2023</a:t>
+              <a:t>9/13/2023</a:t>
             </a:fld>
             <a:endParaRPr lang="en-US"/>
           </a:p>
@@ -683,7 +683,7 @@
           <a:p>
             <a:fld id="{79F87027-2F16-4A68-BA00-E2C1901732B5}" type="datetimeFigureOut">
               <a:rPr lang="en-US" smtClean="0"/>
-              <a:t>9/12/2023</a:t>
+              <a:t>9/13/2023</a:t>
             </a:fld>
             <a:endParaRPr lang="en-US"/>
           </a:p>
@@ -881,7 +881,7 @@
           <a:p>
             <a:fld id="{79F87027-2F16-4A68-BA00-E2C1901732B5}" type="datetimeFigureOut">
               <a:rPr lang="en-US" smtClean="0"/>
-              <a:t>9/12/2023</a:t>
+              <a:t>9/13/2023</a:t>
             </a:fld>
             <a:endParaRPr lang="en-US"/>
           </a:p>
@@ -1156,7 +1156,7 @@
           <a:p>
             <a:fld id="{79F87027-2F16-4A68-BA00-E2C1901732B5}" type="datetimeFigureOut">
               <a:rPr lang="en-US" smtClean="0"/>
-              <a:t>9/12/2023</a:t>
+              <a:t>9/13/2023</a:t>
             </a:fld>
             <a:endParaRPr lang="en-US"/>
           </a:p>
@@ -1421,7 +1421,7 @@
           <a:p>
             <a:fld id="{79F87027-2F16-4A68-BA00-E2C1901732B5}" type="datetimeFigureOut">
               <a:rPr lang="en-US" smtClean="0"/>
-              <a:t>9/12/2023</a:t>
+              <a:t>9/13/2023</a:t>
             </a:fld>
             <a:endParaRPr lang="en-US"/>
           </a:p>
@@ -1833,7 +1833,7 @@
           <a:p>
             <a:fld id="{79F87027-2F16-4A68-BA00-E2C1901732B5}" type="datetimeFigureOut">
               <a:rPr lang="en-US" smtClean="0"/>
-              <a:t>9/12/2023</a:t>
+              <a:t>9/13/2023</a:t>
             </a:fld>
             <a:endParaRPr lang="en-US"/>
           </a:p>
@@ -1974,7 +1974,7 @@
           <a:p>
             <a:fld id="{79F87027-2F16-4A68-BA00-E2C1901732B5}" type="datetimeFigureOut">
               <a:rPr lang="en-US" smtClean="0"/>
-              <a:t>9/12/2023</a:t>
+              <a:t>9/13/2023</a:t>
             </a:fld>
             <a:endParaRPr lang="en-US"/>
           </a:p>
@@ -2087,7 +2087,7 @@
           <a:p>
             <a:fld id="{79F87027-2F16-4A68-BA00-E2C1901732B5}" type="datetimeFigureOut">
               <a:rPr lang="en-US" smtClean="0"/>
-              <a:t>9/12/2023</a:t>
+              <a:t>9/13/2023</a:t>
             </a:fld>
             <a:endParaRPr lang="en-US"/>
           </a:p>
@@ -2398,7 +2398,7 @@
           <a:p>
             <a:fld id="{79F87027-2F16-4A68-BA00-E2C1901732B5}" type="datetimeFigureOut">
               <a:rPr lang="en-US" smtClean="0"/>
-              <a:t>9/12/2023</a:t>
+              <a:t>9/13/2023</a:t>
             </a:fld>
             <a:endParaRPr lang="en-US"/>
           </a:p>
@@ -2686,7 +2686,7 @@
           <a:p>
             <a:fld id="{79F87027-2F16-4A68-BA00-E2C1901732B5}" type="datetimeFigureOut">
               <a:rPr lang="en-US" smtClean="0"/>
-              <a:t>9/12/2023</a:t>
+              <a:t>9/13/2023</a:t>
             </a:fld>
             <a:endParaRPr lang="en-US"/>
           </a:p>
@@ -2768,9 +2768,9 @@
           <a:gsLst>
             <a:gs pos="31000">
               <a:schemeClr val="accent1">
-                <a:lumMod val="0"/>
-                <a:lumOff val="100000"/>
-                <a:alpha val="0"/>
+                <a:lumMod val="33000"/>
+                <a:lumOff val="67000"/>
+                <a:alpha val="17000"/>
               </a:schemeClr>
             </a:gs>
             <a:gs pos="100000">
@@ -2958,7 +2958,7 @@
           <a:p>
             <a:fld id="{79F87027-2F16-4A68-BA00-E2C1901732B5}" type="datetimeFigureOut">
               <a:rPr lang="en-US" smtClean="0"/>
-              <a:t>9/12/2023</a:t>
+              <a:t>9/13/2023</a:t>
             </a:fld>
             <a:endParaRPr lang="en-US"/>
           </a:p>
@@ -3391,7 +3391,12 @@
             <p:ph type="ctrTitle"/>
           </p:nvPr>
         </p:nvSpPr>
-        <p:spPr/>
+        <p:spPr>
+          <a:xfrm>
+            <a:off x="1524000" y="1192306"/>
+            <a:ext cx="9144000" cy="3088622"/>
+          </a:xfrm>
+        </p:spPr>
         <p:txBody>
           <a:bodyPr>
             <a:normAutofit fontScale="90000"/>
@@ -3429,7 +3434,12 @@
             <p:ph type="subTitle" idx="1"/>
           </p:nvPr>
         </p:nvSpPr>
-        <p:spPr/>
+        <p:spPr>
+          <a:xfrm>
+            <a:off x="1524000" y="4280928"/>
+            <a:ext cx="9144000" cy="1655762"/>
+          </a:xfrm>
+        </p:spPr>
         <p:txBody>
           <a:bodyPr/>
           <a:lstStyle/>
@@ -3631,10 +3641,15 @@
             <p:ph idx="1"/>
           </p:nvPr>
         </p:nvSpPr>
-        <p:spPr/>
+        <p:spPr>
+          <a:xfrm>
+            <a:off x="838200" y="1457325"/>
+            <a:ext cx="10515600" cy="2314575"/>
+          </a:xfrm>
+        </p:spPr>
         <p:txBody>
           <a:bodyPr>
-            <a:normAutofit/>
+            <a:normAutofit fontScale="70000" lnSpcReduction="20000"/>
           </a:bodyPr>
           <a:lstStyle/>
           <a:p>
@@ -3710,7 +3725,7 @@
             </a:r>
             <a:r>
               <a:rPr lang="en-US" dirty="0"/>
-              <a:t>` files.</a:t>
+              <a:t>` files, respectively.</a:t>
             </a:r>
           </a:p>
           <a:p>
@@ -3733,6 +3748,122 @@
             <a:r>
               <a:rPr lang="en-US" dirty="0"/>
               <a:t> would be used to perform this action.</a:t>
+            </a:r>
+          </a:p>
+        </p:txBody>
+      </p:sp>
+      <p:pic>
+        <p:nvPicPr>
+          <p:cNvPr id="5" name="Picture 4">
+            <a:extLst>
+              <a:ext uri="{FF2B5EF4-FFF2-40B4-BE49-F238E27FC236}">
+                <a16:creationId xmlns:a16="http://schemas.microsoft.com/office/drawing/2014/main" id="{831508A8-C243-44A6-81FA-D3BD76D53022}"/>
+              </a:ext>
+            </a:extLst>
+          </p:cNvPr>
+          <p:cNvPicPr>
+            <a:picLocks noChangeAspect="1"/>
+          </p:cNvPicPr>
+          <p:nvPr/>
+        </p:nvPicPr>
+        <p:blipFill rotWithShape="1">
+          <a:blip r:embed="rId2">
+            <a:extLst>
+              <a:ext uri="{28A0092B-C50C-407E-A947-70E740481C1C}">
+                <a14:useLocalDpi xmlns:a14="http://schemas.microsoft.com/office/drawing/2010/main" val="0"/>
+              </a:ext>
+            </a:extLst>
+          </a:blip>
+          <a:srcRect r="62025"/>
+          <a:stretch/>
+        </p:blipFill>
+        <p:spPr>
+          <a:xfrm>
+            <a:off x="752136" y="3676828"/>
+            <a:ext cx="2857840" cy="3181172"/>
+          </a:xfrm>
+          <a:prstGeom prst="rect">
+            <a:avLst/>
+          </a:prstGeom>
+          <a:ln w="12700">
+            <a:solidFill>
+              <a:schemeClr val="tx1"/>
+            </a:solidFill>
+          </a:ln>
+        </p:spPr>
+      </p:pic>
+      <p:pic>
+        <p:nvPicPr>
+          <p:cNvPr id="7" name="Picture 6">
+            <a:extLst>
+              <a:ext uri="{FF2B5EF4-FFF2-40B4-BE49-F238E27FC236}">
+                <a16:creationId xmlns:a16="http://schemas.microsoft.com/office/drawing/2014/main" id="{46418725-2C2D-471C-B2E0-E2EAD6F46B6E}"/>
+              </a:ext>
+            </a:extLst>
+          </p:cNvPr>
+          <p:cNvPicPr>
+            <a:picLocks noChangeAspect="1"/>
+          </p:cNvPicPr>
+          <p:nvPr/>
+        </p:nvPicPr>
+        <p:blipFill>
+          <a:blip r:embed="rId3">
+            <a:extLst>
+              <a:ext uri="{28A0092B-C50C-407E-A947-70E740481C1C}">
+                <a14:useLocalDpi xmlns:a14="http://schemas.microsoft.com/office/drawing/2010/main" val="0"/>
+              </a:ext>
+            </a:extLst>
+          </a:blip>
+          <a:stretch>
+            <a:fillRect/>
+          </a:stretch>
+        </p:blipFill>
+        <p:spPr>
+          <a:xfrm>
+            <a:off x="3696040" y="3676828"/>
+            <a:ext cx="7954485" cy="2410161"/>
+          </a:xfrm>
+          <a:prstGeom prst="rect">
+            <a:avLst/>
+          </a:prstGeom>
+          <a:ln w="12700">
+            <a:solidFill>
+              <a:schemeClr val="tx1"/>
+            </a:solidFill>
+          </a:ln>
+        </p:spPr>
+      </p:pic>
+      <p:sp>
+        <p:nvSpPr>
+          <p:cNvPr id="8" name="TextBox 7">
+            <a:extLst>
+              <a:ext uri="{FF2B5EF4-FFF2-40B4-BE49-F238E27FC236}">
+                <a16:creationId xmlns:a16="http://schemas.microsoft.com/office/drawing/2014/main" id="{A667047E-CC90-459C-A5F3-D5D3760F467F}"/>
+              </a:ext>
+            </a:extLst>
+          </p:cNvPr>
+          <p:cNvSpPr txBox="1"/>
+          <p:nvPr/>
+        </p:nvSpPr>
+        <p:spPr>
+          <a:xfrm>
+            <a:off x="4648200" y="6210300"/>
+            <a:ext cx="6019800" cy="369332"/>
+          </a:xfrm>
+          <a:prstGeom prst="rect">
+            <a:avLst/>
+          </a:prstGeom>
+          <a:noFill/>
+        </p:spPr>
+        <p:txBody>
+          <a:bodyPr wrap="square" rtlCol="0">
+            <a:spAutoFit/>
+          </a:bodyPr>
+          <a:lstStyle/>
+          <a:p>
+            <a:r>
+              <a:rPr lang="en-US" dirty="0"/>
+              <a:t>Figure 5: Scheduled task settings for auto-updating database.</a:t>
             </a:r>
           </a:p>
         </p:txBody>
@@ -3870,7 +4001,7 @@
             <a:pPr algn="ctr"/>
             <a:r>
               <a:rPr lang="en-US" dirty="0"/>
-              <a:t>Figure 5: Mongo Database </a:t>
+              <a:t>Figure 6: Mongo Database </a:t>
             </a:r>
             <a:r>
               <a:rPr lang="en-US" dirty="0" err="1"/>
@@ -3913,7 +4044,7 @@
           <a:p>
             <a:r>
               <a:rPr lang="en-US" dirty="0"/>
-              <a:t>Figure 6: PostgreSQL DB Architecture (Right)</a:t>
+              <a:t>Figure 7: PostgreSQL DB Architecture (Right)</a:t>
             </a:r>
           </a:p>
         </p:txBody>
@@ -3934,315 +4065,6 @@
 <file path=ppt/slides/slide13.xml><?xml version="1.0" encoding="utf-8"?>
 <p:sld xmlns:a="http://schemas.openxmlformats.org/drawingml/2006/main" xmlns:r="http://schemas.openxmlformats.org/officeDocument/2006/relationships" xmlns:p="http://schemas.openxmlformats.org/presentationml/2006/main">
   <p:cSld>
-    <p:spTree>
-      <p:nvGrpSpPr>
-        <p:cNvPr id="1" name=""/>
-        <p:cNvGrpSpPr/>
-        <p:nvPr/>
-      </p:nvGrpSpPr>
-      <p:grpSpPr>
-        <a:xfrm>
-          <a:off x="0" y="0"/>
-          <a:ext cx="0" cy="0"/>
-          <a:chOff x="0" y="0"/>
-          <a:chExt cx="0" cy="0"/>
-        </a:xfrm>
-      </p:grpSpPr>
-      <p:sp>
-        <p:nvSpPr>
-          <p:cNvPr id="2" name="Title 1">
-            <a:extLst>
-              <a:ext uri="{FF2B5EF4-FFF2-40B4-BE49-F238E27FC236}">
-                <a16:creationId xmlns:a16="http://schemas.microsoft.com/office/drawing/2014/main" id="{09FA37C1-8184-47F8-A58B-9ED074665809}"/>
-              </a:ext>
-            </a:extLst>
-          </p:cNvPr>
-          <p:cNvSpPr>
-            <a:spLocks noGrp="1"/>
-          </p:cNvSpPr>
-          <p:nvPr>
-            <p:ph type="title"/>
-          </p:nvPr>
-        </p:nvSpPr>
-        <p:spPr/>
-        <p:txBody>
-          <a:bodyPr/>
-          <a:lstStyle/>
-          <a:p>
-            <a:r>
-              <a:rPr lang="en-US" dirty="0"/>
-              <a:t>Implementation (</a:t>
-            </a:r>
-            <a:r>
-              <a:rPr lang="en-US" dirty="0" err="1"/>
-              <a:t>cont</a:t>
-            </a:r>
-            <a:r>
-              <a:rPr lang="en-US" dirty="0"/>
-              <a:t>)</a:t>
-            </a:r>
-          </a:p>
-        </p:txBody>
-      </p:sp>
-      <p:sp>
-        <p:nvSpPr>
-          <p:cNvPr id="3" name="Content Placeholder 2">
-            <a:extLst>
-              <a:ext uri="{FF2B5EF4-FFF2-40B4-BE49-F238E27FC236}">
-                <a16:creationId xmlns:a16="http://schemas.microsoft.com/office/drawing/2014/main" id="{D1A62039-4573-4885-87AC-F650891BBC5D}"/>
-              </a:ext>
-            </a:extLst>
-          </p:cNvPr>
-          <p:cNvSpPr>
-            <a:spLocks noGrp="1"/>
-          </p:cNvSpPr>
-          <p:nvPr>
-            <p:ph idx="1"/>
-          </p:nvPr>
-        </p:nvSpPr>
-        <p:spPr/>
-        <p:txBody>
-          <a:bodyPr/>
-          <a:lstStyle/>
-          <a:p>
-            <a:r>
-              <a:rPr lang="en-US" dirty="0"/>
-              <a:t>The Vue application serves the landing page, featuring a brief explanation, a series of disclaimers and a short set of instructions to guide new users.</a:t>
-            </a:r>
-          </a:p>
-          <a:p>
-            <a:r>
-              <a:rPr lang="en-US" dirty="0"/>
-              <a:t>The main page (</a:t>
-            </a:r>
-            <a:r>
-              <a:rPr lang="en-US" dirty="0">
-                <a:latin typeface="Miriam Mono CLM" panose="02000503000000000000" pitchFamily="2" charset="-79"/>
-                <a:cs typeface="Miriam Mono CLM" panose="02000503000000000000" pitchFamily="2" charset="-79"/>
-              </a:rPr>
-              <a:t>/main</a:t>
-            </a:r>
-            <a:r>
-              <a:rPr lang="en-US" dirty="0">
-                <a:cs typeface="Miriam Mono CLM" panose="02000503000000000000" pitchFamily="2" charset="-79"/>
-              </a:rPr>
-              <a:t>) </a:t>
-            </a:r>
-            <a:r>
-              <a:rPr lang="en-US" dirty="0"/>
-              <a:t>features the core component of the application, with the user team input form and output areas of the application.</a:t>
-            </a:r>
-          </a:p>
-          <a:p>
-            <a:r>
-              <a:rPr lang="en-US" dirty="0" err="1">
-                <a:latin typeface="Miriam Mono CLM" panose="02000503000000000000" pitchFamily="2" charset="-79"/>
-                <a:cs typeface="Miriam Mono CLM" panose="02000503000000000000" pitchFamily="2" charset="-79"/>
-              </a:rPr>
-              <a:t>VueRouter</a:t>
-            </a:r>
-            <a:r>
-              <a:rPr lang="en-US" dirty="0"/>
-              <a:t> handles routes between the different pages in the application by creating aliases for the different views, special </a:t>
-            </a:r>
-            <a:r>
-              <a:rPr lang="en-US" dirty="0" err="1">
-                <a:latin typeface="Miriam Mono CLM" panose="02000503000000000000" pitchFamily="2" charset="-79"/>
-                <a:cs typeface="Miriam Mono CLM" panose="02000503000000000000" pitchFamily="2" charset="-79"/>
-              </a:rPr>
-              <a:t>RouterLink</a:t>
-            </a:r>
-            <a:r>
-              <a:rPr lang="en-US" dirty="0"/>
-              <a:t> tags function like anchor tags and allow router links to redirect to different views</a:t>
-            </a:r>
-          </a:p>
-        </p:txBody>
-      </p:sp>
-    </p:spTree>
-    <p:extLst>
-      <p:ext uri="{BB962C8B-B14F-4D97-AF65-F5344CB8AC3E}">
-        <p14:creationId xmlns:p14="http://schemas.microsoft.com/office/powerpoint/2010/main" val="1181502991"/>
-      </p:ext>
-    </p:extLst>
-  </p:cSld>
-  <p:clrMapOvr>
-    <a:masterClrMapping/>
-  </p:clrMapOvr>
-</p:sld>
-</file>
-
-<file path=ppt/slides/slide14.xml><?xml version="1.0" encoding="utf-8"?>
-<p:sld xmlns:a="http://schemas.openxmlformats.org/drawingml/2006/main" xmlns:r="http://schemas.openxmlformats.org/officeDocument/2006/relationships" xmlns:p="http://schemas.openxmlformats.org/presentationml/2006/main">
-  <p:cSld>
-    <p:spTree>
-      <p:nvGrpSpPr>
-        <p:cNvPr id="1" name=""/>
-        <p:cNvGrpSpPr/>
-        <p:nvPr/>
-      </p:nvGrpSpPr>
-      <p:grpSpPr>
-        <a:xfrm>
-          <a:off x="0" y="0"/>
-          <a:ext cx="0" cy="0"/>
-          <a:chOff x="0" y="0"/>
-          <a:chExt cx="0" cy="0"/>
-        </a:xfrm>
-      </p:grpSpPr>
-      <p:pic>
-        <p:nvPicPr>
-          <p:cNvPr id="3" name="Picture 2">
-            <a:extLst>
-              <a:ext uri="{FF2B5EF4-FFF2-40B4-BE49-F238E27FC236}">
-                <a16:creationId xmlns:a16="http://schemas.microsoft.com/office/drawing/2014/main" id="{D87F076D-DEBB-47C8-86D1-5BC6366B4749}"/>
-              </a:ext>
-            </a:extLst>
-          </p:cNvPr>
-          <p:cNvPicPr>
-            <a:picLocks noChangeAspect="1"/>
-          </p:cNvPicPr>
-          <p:nvPr/>
-        </p:nvPicPr>
-        <p:blipFill>
-          <a:blip r:embed="rId2">
-            <a:extLst>
-              <a:ext uri="{28A0092B-C50C-407E-A947-70E740481C1C}">
-                <a14:useLocalDpi xmlns:a14="http://schemas.microsoft.com/office/drawing/2010/main" val="0"/>
-              </a:ext>
-            </a:extLst>
-          </a:blip>
-          <a:stretch>
-            <a:fillRect/>
-          </a:stretch>
-        </p:blipFill>
-        <p:spPr>
-          <a:xfrm>
-            <a:off x="-150000" y="0"/>
-            <a:ext cx="7531875" cy="3646762"/>
-          </a:xfrm>
-          <a:prstGeom prst="rect">
-            <a:avLst/>
-          </a:prstGeom>
-        </p:spPr>
-      </p:pic>
-      <p:pic>
-        <p:nvPicPr>
-          <p:cNvPr id="2" name="Picture 1">
-            <a:extLst>
-              <a:ext uri="{FF2B5EF4-FFF2-40B4-BE49-F238E27FC236}">
-                <a16:creationId xmlns:a16="http://schemas.microsoft.com/office/drawing/2014/main" id="{02C0D20A-B45A-4746-8CDF-086B0D444846}"/>
-              </a:ext>
-            </a:extLst>
-          </p:cNvPr>
-          <p:cNvPicPr>
-            <a:picLocks noChangeAspect="1"/>
-          </p:cNvPicPr>
-          <p:nvPr/>
-        </p:nvPicPr>
-        <p:blipFill>
-          <a:blip r:embed="rId3">
-            <a:extLst>
-              <a:ext uri="{28A0092B-C50C-407E-A947-70E740481C1C}">
-                <a14:useLocalDpi xmlns:a14="http://schemas.microsoft.com/office/drawing/2010/main" val="0"/>
-              </a:ext>
-            </a:extLst>
-          </a:blip>
-          <a:stretch>
-            <a:fillRect/>
-          </a:stretch>
-        </p:blipFill>
-        <p:spPr>
-          <a:xfrm>
-            <a:off x="4252714" y="3027098"/>
-            <a:ext cx="7939286" cy="3830902"/>
-          </a:xfrm>
-          <a:prstGeom prst="rect">
-            <a:avLst/>
-          </a:prstGeom>
-        </p:spPr>
-      </p:pic>
-      <p:sp>
-        <p:nvSpPr>
-          <p:cNvPr id="4" name="Arrow: Bent 3">
-            <a:extLst>
-              <a:ext uri="{FF2B5EF4-FFF2-40B4-BE49-F238E27FC236}">
-                <a16:creationId xmlns:a16="http://schemas.microsoft.com/office/drawing/2014/main" id="{35891D20-AA30-4DAA-8339-720C7055D1A3}"/>
-              </a:ext>
-            </a:extLst>
-          </p:cNvPr>
-          <p:cNvSpPr/>
-          <p:nvPr/>
-        </p:nvSpPr>
-        <p:spPr>
-          <a:xfrm flipV="1">
-            <a:off x="1314450" y="3709331"/>
-            <a:ext cx="2804914" cy="1543050"/>
-          </a:xfrm>
-          <a:prstGeom prst="bentArrow">
-            <a:avLst>
-              <a:gd name="adj1" fmla="val 25000"/>
-              <a:gd name="adj2" fmla="val 26543"/>
-              <a:gd name="adj3" fmla="val 25000"/>
-              <a:gd name="adj4" fmla="val 43750"/>
-            </a:avLst>
-          </a:prstGeom>
-          <a:solidFill>
-            <a:schemeClr val="tx1"/>
-          </a:solidFill>
-        </p:spPr>
-        <p:style>
-          <a:lnRef idx="2">
-            <a:schemeClr val="accent1">
-              <a:shade val="50000"/>
-            </a:schemeClr>
-          </a:lnRef>
-          <a:fillRef idx="1">
-            <a:schemeClr val="accent1"/>
-          </a:fillRef>
-          <a:effectRef idx="0">
-            <a:schemeClr val="accent1"/>
-          </a:effectRef>
-          <a:fontRef idx="minor">
-            <a:schemeClr val="lt1"/>
-          </a:fontRef>
-        </p:style>
-        <p:txBody>
-          <a:bodyPr rtlCol="0" anchor="ctr"/>
-          <a:lstStyle/>
-          <a:p>
-            <a:pPr algn="ctr"/>
-            <a:endParaRPr lang="en-US">
-              <a:solidFill>
-                <a:schemeClr val="tx1"/>
-              </a:solidFill>
-            </a:endParaRPr>
-          </a:p>
-        </p:txBody>
-      </p:sp>
-    </p:spTree>
-    <p:extLst>
-      <p:ext uri="{BB962C8B-B14F-4D97-AF65-F5344CB8AC3E}">
-        <p14:creationId xmlns:p14="http://schemas.microsoft.com/office/powerpoint/2010/main" val="2206245502"/>
-      </p:ext>
-    </p:extLst>
-  </p:cSld>
-  <p:clrMapOvr>
-    <a:masterClrMapping/>
-  </p:clrMapOvr>
-</p:sld>
-</file>
-
-<file path=ppt/slides/slide15.xml><?xml version="1.0" encoding="utf-8"?>
-<p:sld xmlns:a="http://schemas.openxmlformats.org/drawingml/2006/main" xmlns:r="http://schemas.openxmlformats.org/officeDocument/2006/relationships" xmlns:p="http://schemas.openxmlformats.org/presentationml/2006/main">
-  <p:cSld>
-    <p:bg>
-      <p:bgPr>
-        <a:solidFill>
-          <a:schemeClr val="bg1"/>
-        </a:solidFill>
-        <a:effectLst/>
-      </p:bgPr>
-    </p:bg>
     <p:spTree>
       <p:nvGrpSpPr>
         <p:cNvPr id="1" name=""/>
@@ -4538,7 +4360,7 @@
           <a:p>
             <a:r>
               <a:rPr lang="en-US" dirty="0"/>
-              <a:t>Figure 7: Express Routes (Left, Middle) and Vue Routes (Right) </a:t>
+              <a:t>Figure 8: Express Routes (Left, Middle) and Vue Routes (Right) </a:t>
             </a:r>
           </a:p>
         </p:txBody>
@@ -4547,6 +4369,437 @@
     <p:extLst>
       <p:ext uri="{BB962C8B-B14F-4D97-AF65-F5344CB8AC3E}">
         <p14:creationId xmlns:p14="http://schemas.microsoft.com/office/powerpoint/2010/main" val="1406519572"/>
+      </p:ext>
+    </p:extLst>
+  </p:cSld>
+  <p:clrMapOvr>
+    <a:masterClrMapping/>
+  </p:clrMapOvr>
+</p:sld>
+</file>
+
+<file path=ppt/slides/slide14.xml><?xml version="1.0" encoding="utf-8"?>
+<p:sld xmlns:a="http://schemas.openxmlformats.org/drawingml/2006/main" xmlns:r="http://schemas.openxmlformats.org/officeDocument/2006/relationships" xmlns:p="http://schemas.openxmlformats.org/presentationml/2006/main">
+  <p:cSld>
+    <p:spTree>
+      <p:nvGrpSpPr>
+        <p:cNvPr id="1" name=""/>
+        <p:cNvGrpSpPr/>
+        <p:nvPr/>
+      </p:nvGrpSpPr>
+      <p:grpSpPr>
+        <a:xfrm>
+          <a:off x="0" y="0"/>
+          <a:ext cx="0" cy="0"/>
+          <a:chOff x="0" y="0"/>
+          <a:chExt cx="0" cy="0"/>
+        </a:xfrm>
+      </p:grpSpPr>
+      <p:sp>
+        <p:nvSpPr>
+          <p:cNvPr id="2" name="Title 1">
+            <a:extLst>
+              <a:ext uri="{FF2B5EF4-FFF2-40B4-BE49-F238E27FC236}">
+                <a16:creationId xmlns:a16="http://schemas.microsoft.com/office/drawing/2014/main" id="{09FA37C1-8184-47F8-A58B-9ED074665809}"/>
+              </a:ext>
+            </a:extLst>
+          </p:cNvPr>
+          <p:cNvSpPr>
+            <a:spLocks noGrp="1"/>
+          </p:cNvSpPr>
+          <p:nvPr>
+            <p:ph type="title"/>
+          </p:nvPr>
+        </p:nvSpPr>
+        <p:spPr/>
+        <p:txBody>
+          <a:bodyPr/>
+          <a:lstStyle/>
+          <a:p>
+            <a:r>
+              <a:rPr lang="en-US" dirty="0"/>
+              <a:t>Implementation (</a:t>
+            </a:r>
+            <a:r>
+              <a:rPr lang="en-US" dirty="0" err="1"/>
+              <a:t>cont</a:t>
+            </a:r>
+            <a:r>
+              <a:rPr lang="en-US" dirty="0"/>
+              <a:t>)</a:t>
+            </a:r>
+          </a:p>
+        </p:txBody>
+      </p:sp>
+      <p:sp>
+        <p:nvSpPr>
+          <p:cNvPr id="3" name="Content Placeholder 2">
+            <a:extLst>
+              <a:ext uri="{FF2B5EF4-FFF2-40B4-BE49-F238E27FC236}">
+                <a16:creationId xmlns:a16="http://schemas.microsoft.com/office/drawing/2014/main" id="{D1A62039-4573-4885-87AC-F650891BBC5D}"/>
+              </a:ext>
+            </a:extLst>
+          </p:cNvPr>
+          <p:cNvSpPr>
+            <a:spLocks noGrp="1"/>
+          </p:cNvSpPr>
+          <p:nvPr>
+            <p:ph idx="1"/>
+          </p:nvPr>
+        </p:nvSpPr>
+        <p:spPr>
+          <a:xfrm>
+            <a:off x="590551" y="1539076"/>
+            <a:ext cx="5895974" cy="4637887"/>
+          </a:xfrm>
+        </p:spPr>
+        <p:txBody>
+          <a:bodyPr>
+            <a:normAutofit fontScale="70000" lnSpcReduction="20000"/>
+          </a:bodyPr>
+          <a:lstStyle/>
+          <a:p>
+            <a:r>
+              <a:rPr lang="en-US" dirty="0"/>
+              <a:t>The main page (</a:t>
+            </a:r>
+            <a:r>
+              <a:rPr lang="en-US" dirty="0">
+                <a:latin typeface="Miriam Mono CLM" panose="02000503000000000000" pitchFamily="2" charset="-79"/>
+                <a:cs typeface="Miriam Mono CLM" panose="02000503000000000000" pitchFamily="2" charset="-79"/>
+              </a:rPr>
+              <a:t>/main</a:t>
+            </a:r>
+            <a:r>
+              <a:rPr lang="en-US" dirty="0">
+                <a:cs typeface="Miriam Mono CLM" panose="02000503000000000000" pitchFamily="2" charset="-79"/>
+              </a:rPr>
+              <a:t>) </a:t>
+            </a:r>
+            <a:r>
+              <a:rPr lang="en-US" dirty="0"/>
+              <a:t>features the core component of the application, with the user team input form and output areas of the application.</a:t>
+            </a:r>
+          </a:p>
+          <a:p>
+            <a:r>
+              <a:rPr lang="en-US" dirty="0" err="1">
+                <a:latin typeface="Miriam Mono CLM" panose="02000503000000000000" pitchFamily="2" charset="-79"/>
+                <a:cs typeface="Miriam Mono CLM" panose="02000503000000000000" pitchFamily="2" charset="-79"/>
+              </a:rPr>
+              <a:t>VueRouter</a:t>
+            </a:r>
+            <a:r>
+              <a:rPr lang="en-US" dirty="0"/>
+              <a:t> handles routes between the different pages in the application by creating aliases for the different views, special </a:t>
+            </a:r>
+            <a:r>
+              <a:rPr lang="en-US" dirty="0" err="1">
+                <a:latin typeface="Miriam Mono CLM" panose="02000503000000000000" pitchFamily="2" charset="-79"/>
+                <a:cs typeface="Miriam Mono CLM" panose="02000503000000000000" pitchFamily="2" charset="-79"/>
+              </a:rPr>
+              <a:t>RouterLink</a:t>
+            </a:r>
+            <a:r>
+              <a:rPr lang="en-US" dirty="0"/>
+              <a:t> tags function like anchor tags and allow router links to redirect to different views</a:t>
+            </a:r>
+          </a:p>
+          <a:p>
+            <a:r>
+              <a:rPr lang="en-US" dirty="0"/>
+              <a:t>Vue develops with components, which separate applications into re-usable parts. </a:t>
+            </a:r>
+          </a:p>
+          <a:p>
+            <a:r>
+              <a:rPr lang="en-US" dirty="0"/>
+              <a:t>A Vue component that contains many subcomponents are usually described as Views, while the parts of a View are described as Components</a:t>
+            </a:r>
+          </a:p>
+          <a:p>
+            <a:r>
+              <a:rPr lang="en-US" dirty="0"/>
+              <a:t>Props are used in Vue to pass data from a parent component to a child component</a:t>
+            </a:r>
+          </a:p>
+        </p:txBody>
+      </p:sp>
+      <p:sp>
+        <p:nvSpPr>
+          <p:cNvPr id="5" name="TextBox 4">
+            <a:extLst>
+              <a:ext uri="{FF2B5EF4-FFF2-40B4-BE49-F238E27FC236}">
+                <a16:creationId xmlns:a16="http://schemas.microsoft.com/office/drawing/2014/main" id="{3E96EC72-EC05-4598-910A-E04D3E258BDB}"/>
+              </a:ext>
+            </a:extLst>
+          </p:cNvPr>
+          <p:cNvSpPr txBox="1"/>
+          <p:nvPr/>
+        </p:nvSpPr>
+        <p:spPr>
+          <a:xfrm>
+            <a:off x="7678869" y="6000641"/>
+            <a:ext cx="3120761" cy="646331"/>
+          </a:xfrm>
+          <a:prstGeom prst="rect">
+            <a:avLst/>
+          </a:prstGeom>
+          <a:noFill/>
+        </p:spPr>
+        <p:txBody>
+          <a:bodyPr wrap="square" rtlCol="0">
+            <a:spAutoFit/>
+          </a:bodyPr>
+          <a:lstStyle/>
+          <a:p>
+            <a:r>
+              <a:rPr lang="en-US" dirty="0"/>
+              <a:t>Figure 9: Example of Vue code within a Vue Component</a:t>
+            </a:r>
+          </a:p>
+        </p:txBody>
+      </p:sp>
+      <p:pic>
+        <p:nvPicPr>
+          <p:cNvPr id="6" name="Picture 5">
+            <a:extLst>
+              <a:ext uri="{FF2B5EF4-FFF2-40B4-BE49-F238E27FC236}">
+                <a16:creationId xmlns:a16="http://schemas.microsoft.com/office/drawing/2014/main" id="{5AD8F853-C1D9-4C3B-ADB3-1435B35AC99B}"/>
+              </a:ext>
+            </a:extLst>
+          </p:cNvPr>
+          <p:cNvPicPr>
+            <a:picLocks noChangeAspect="1"/>
+          </p:cNvPicPr>
+          <p:nvPr/>
+        </p:nvPicPr>
+        <p:blipFill>
+          <a:blip r:embed="rId2"/>
+          <a:stretch>
+            <a:fillRect/>
+          </a:stretch>
+        </p:blipFill>
+        <p:spPr>
+          <a:xfrm>
+            <a:off x="7268427" y="857358"/>
+            <a:ext cx="3941643" cy="5143283"/>
+          </a:xfrm>
+          <a:prstGeom prst="rect">
+            <a:avLst/>
+          </a:prstGeom>
+        </p:spPr>
+      </p:pic>
+    </p:spTree>
+    <p:extLst>
+      <p:ext uri="{BB962C8B-B14F-4D97-AF65-F5344CB8AC3E}">
+        <p14:creationId xmlns:p14="http://schemas.microsoft.com/office/powerpoint/2010/main" val="1181502991"/>
+      </p:ext>
+    </p:extLst>
+  </p:cSld>
+  <p:clrMapOvr>
+    <a:masterClrMapping/>
+  </p:clrMapOvr>
+</p:sld>
+</file>
+
+<file path=ppt/slides/slide15.xml><?xml version="1.0" encoding="utf-8"?>
+<p:sld xmlns:a="http://schemas.openxmlformats.org/drawingml/2006/main" xmlns:r="http://schemas.openxmlformats.org/officeDocument/2006/relationships" xmlns:p="http://schemas.openxmlformats.org/presentationml/2006/main">
+  <p:cSld>
+    <p:spTree>
+      <p:nvGrpSpPr>
+        <p:cNvPr id="1" name=""/>
+        <p:cNvGrpSpPr/>
+        <p:nvPr/>
+      </p:nvGrpSpPr>
+      <p:grpSpPr>
+        <a:xfrm>
+          <a:off x="0" y="0"/>
+          <a:ext cx="0" cy="0"/>
+          <a:chOff x="0" y="0"/>
+          <a:chExt cx="0" cy="0"/>
+        </a:xfrm>
+      </p:grpSpPr>
+      <p:sp>
+        <p:nvSpPr>
+          <p:cNvPr id="2" name="Title 1">
+            <a:extLst>
+              <a:ext uri="{FF2B5EF4-FFF2-40B4-BE49-F238E27FC236}">
+                <a16:creationId xmlns:a16="http://schemas.microsoft.com/office/drawing/2014/main" id="{CEBAA8B2-2EA1-4B15-81AB-F9FF92AFC670}"/>
+              </a:ext>
+            </a:extLst>
+          </p:cNvPr>
+          <p:cNvSpPr>
+            <a:spLocks noGrp="1"/>
+          </p:cNvSpPr>
+          <p:nvPr>
+            <p:ph type="title"/>
+          </p:nvPr>
+        </p:nvSpPr>
+        <p:spPr/>
+        <p:txBody>
+          <a:bodyPr/>
+          <a:lstStyle/>
+          <a:p>
+            <a:r>
+              <a:rPr lang="en-US" dirty="0"/>
+              <a:t>Implementation (</a:t>
+            </a:r>
+            <a:r>
+              <a:rPr lang="en-US" dirty="0" err="1"/>
+              <a:t>cont</a:t>
+            </a:r>
+            <a:r>
+              <a:rPr lang="en-US" dirty="0"/>
+              <a:t>)</a:t>
+            </a:r>
+          </a:p>
+        </p:txBody>
+      </p:sp>
+      <p:sp>
+        <p:nvSpPr>
+          <p:cNvPr id="3" name="Content Placeholder 2">
+            <a:extLst>
+              <a:ext uri="{FF2B5EF4-FFF2-40B4-BE49-F238E27FC236}">
+                <a16:creationId xmlns:a16="http://schemas.microsoft.com/office/drawing/2014/main" id="{9A58EB9F-13AB-4243-9D59-77F00F6789F8}"/>
+              </a:ext>
+            </a:extLst>
+          </p:cNvPr>
+          <p:cNvSpPr>
+            <a:spLocks noGrp="1"/>
+          </p:cNvSpPr>
+          <p:nvPr>
+            <p:ph idx="1"/>
+          </p:nvPr>
+        </p:nvSpPr>
+        <p:spPr>
+          <a:xfrm>
+            <a:off x="838200" y="1825625"/>
+            <a:ext cx="6560482" cy="4351338"/>
+          </a:xfrm>
+        </p:spPr>
+        <p:txBody>
+          <a:bodyPr>
+            <a:normAutofit/>
+          </a:bodyPr>
+          <a:lstStyle/>
+          <a:p>
+            <a:r>
+              <a:rPr lang="en-US" dirty="0" err="1"/>
+              <a:t>Pinia</a:t>
+            </a:r>
+            <a:r>
+              <a:rPr lang="en-US" dirty="0"/>
+              <a:t> stores are used to manage state control for submitted teams, and user login and authorization.</a:t>
+            </a:r>
+          </a:p>
+          <a:p>
+            <a:r>
+              <a:rPr lang="en-US" dirty="0"/>
+              <a:t>Stores update as changes are made through user interaction. By default stores do </a:t>
+            </a:r>
+            <a:r>
+              <a:rPr lang="en-US" b="1" dirty="0"/>
+              <a:t>not</a:t>
+            </a:r>
+            <a:r>
+              <a:rPr lang="en-US" dirty="0"/>
+              <a:t> persist after navigating away from the application or refreshing the page. </a:t>
+            </a:r>
+          </a:p>
+          <a:p>
+            <a:r>
+              <a:rPr lang="en-US" dirty="0"/>
+              <a:t>Stores interact with the API, depending on the desired functionality, and middleman front-end and back-end interactions</a:t>
+            </a:r>
+          </a:p>
+        </p:txBody>
+      </p:sp>
+      <p:pic>
+        <p:nvPicPr>
+          <p:cNvPr id="4" name="Picture 3">
+            <a:extLst>
+              <a:ext uri="{FF2B5EF4-FFF2-40B4-BE49-F238E27FC236}">
+                <a16:creationId xmlns:a16="http://schemas.microsoft.com/office/drawing/2014/main" id="{507E80A9-3E44-40BC-BA6F-7BEE8CF89AD9}"/>
+              </a:ext>
+            </a:extLst>
+          </p:cNvPr>
+          <p:cNvPicPr>
+            <a:picLocks noChangeAspect="1"/>
+          </p:cNvPicPr>
+          <p:nvPr/>
+        </p:nvPicPr>
+        <p:blipFill>
+          <a:blip r:embed="rId2"/>
+          <a:stretch>
+            <a:fillRect/>
+          </a:stretch>
+        </p:blipFill>
+        <p:spPr>
+          <a:xfrm>
+            <a:off x="7675063" y="727428"/>
+            <a:ext cx="3402356" cy="5254272"/>
+          </a:xfrm>
+          <a:prstGeom prst="rect">
+            <a:avLst/>
+          </a:prstGeom>
+        </p:spPr>
+      </p:pic>
+      <p:sp>
+        <p:nvSpPr>
+          <p:cNvPr id="5" name="TextBox 4">
+            <a:extLst>
+              <a:ext uri="{FF2B5EF4-FFF2-40B4-BE49-F238E27FC236}">
+                <a16:creationId xmlns:a16="http://schemas.microsoft.com/office/drawing/2014/main" id="{F73F1084-3A6D-4722-8AB0-A2E9A7698A87}"/>
+              </a:ext>
+            </a:extLst>
+          </p:cNvPr>
+          <p:cNvSpPr txBox="1"/>
+          <p:nvPr/>
+        </p:nvSpPr>
+        <p:spPr>
+          <a:xfrm>
+            <a:off x="7961856" y="6020837"/>
+            <a:ext cx="2828769" cy="646331"/>
+          </a:xfrm>
+          <a:prstGeom prst="rect">
+            <a:avLst/>
+          </a:prstGeom>
+          <a:noFill/>
+        </p:spPr>
+        <p:txBody>
+          <a:bodyPr wrap="square" rtlCol="0">
+            <a:spAutoFit/>
+          </a:bodyPr>
+          <a:lstStyle/>
+          <a:p>
+            <a:r>
+              <a:rPr lang="en-US" dirty="0"/>
+              <a:t>Figure 12: </a:t>
+            </a:r>
+            <a:r>
+              <a:rPr lang="en-US" dirty="0" err="1"/>
+              <a:t>statStore</a:t>
+            </a:r>
+            <a:r>
+              <a:rPr lang="en-US" dirty="0"/>
+              <a:t>, an example of a </a:t>
+            </a:r>
+            <a:r>
+              <a:rPr lang="en-US" dirty="0" err="1"/>
+              <a:t>Pinia</a:t>
+            </a:r>
+            <a:r>
+              <a:rPr lang="en-US" dirty="0"/>
+              <a:t> store</a:t>
+            </a:r>
+          </a:p>
+        </p:txBody>
+      </p:sp>
+    </p:spTree>
+    <p:extLst>
+      <p:ext uri="{BB962C8B-B14F-4D97-AF65-F5344CB8AC3E}">
+        <p14:creationId xmlns:p14="http://schemas.microsoft.com/office/powerpoint/2010/main" val="1484384226"/>
       </p:ext>
     </p:extLst>
   </p:cSld>
@@ -4573,97 +4826,177 @@
           <a:chExt cx="0" cy="0"/>
         </a:xfrm>
       </p:grpSpPr>
-      <p:sp>
-        <p:nvSpPr>
-          <p:cNvPr id="2" name="Title 1">
-            <a:extLst>
-              <a:ext uri="{FF2B5EF4-FFF2-40B4-BE49-F238E27FC236}">
-                <a16:creationId xmlns:a16="http://schemas.microsoft.com/office/drawing/2014/main" id="{CEBAA8B2-2EA1-4B15-81AB-F9FF92AFC670}"/>
-              </a:ext>
-            </a:extLst>
-          </p:cNvPr>
-          <p:cNvSpPr>
-            <a:spLocks noGrp="1"/>
-          </p:cNvSpPr>
-          <p:nvPr>
-            <p:ph type="title"/>
-          </p:nvPr>
-        </p:nvSpPr>
-        <p:spPr/>
-        <p:txBody>
-          <a:bodyPr/>
-          <a:lstStyle/>
-          <a:p>
-            <a:r>
-              <a:rPr lang="en-US" dirty="0"/>
-              <a:t>Implementation (</a:t>
-            </a:r>
-            <a:r>
-              <a:rPr lang="en-US" dirty="0" err="1"/>
-              <a:t>cont</a:t>
-            </a:r>
-            <a:r>
-              <a:rPr lang="en-US" dirty="0"/>
-              <a:t>)</a:t>
-            </a:r>
-          </a:p>
-        </p:txBody>
-      </p:sp>
-      <p:sp>
-        <p:nvSpPr>
-          <p:cNvPr id="3" name="Content Placeholder 2">
-            <a:extLst>
-              <a:ext uri="{FF2B5EF4-FFF2-40B4-BE49-F238E27FC236}">
-                <a16:creationId xmlns:a16="http://schemas.microsoft.com/office/drawing/2014/main" id="{9A58EB9F-13AB-4243-9D59-77F00F6789F8}"/>
-              </a:ext>
-            </a:extLst>
-          </p:cNvPr>
-          <p:cNvSpPr>
-            <a:spLocks noGrp="1"/>
-          </p:cNvSpPr>
-          <p:nvPr>
-            <p:ph idx="1"/>
-          </p:nvPr>
-        </p:nvSpPr>
-        <p:spPr/>
-        <p:txBody>
-          <a:bodyPr/>
-          <a:lstStyle/>
-          <a:p>
-            <a:r>
-              <a:rPr lang="en-US" dirty="0" err="1"/>
-              <a:t>Pinia</a:t>
-            </a:r>
-            <a:r>
-              <a:rPr lang="en-US" dirty="0"/>
-              <a:t> stores are used to manage state control for submitted teams, and user login and authorization.</a:t>
-            </a:r>
-          </a:p>
-          <a:p>
-            <a:r>
-              <a:rPr lang="en-US" dirty="0"/>
-              <a:t>Stores update as changes are made through user interaction. Due to lack of cookie implementation, stores do </a:t>
-            </a:r>
-            <a:r>
-              <a:rPr lang="en-US" b="1" dirty="0"/>
-              <a:t>not</a:t>
-            </a:r>
-            <a:r>
-              <a:rPr lang="en-US" dirty="0"/>
-              <a:t> persist after navigating away from the application or refreshing the page. </a:t>
-            </a:r>
-          </a:p>
-          <a:p>
-            <a:pPr lvl="1"/>
-            <a:r>
-              <a:rPr lang="en-US" dirty="0"/>
-              <a:t>Future implementations would use cookies to have a smoother user experience.</a:t>
-            </a:r>
-          </a:p>
-          <a:p>
-            <a:r>
-              <a:rPr lang="en-US" dirty="0"/>
-              <a:t>Stores interact with the API, depending on the desired functionality, and middleman front-end and back-end interactions</a:t>
+      <p:pic>
+        <p:nvPicPr>
+          <p:cNvPr id="3" name="Picture 2">
+            <a:extLst>
+              <a:ext uri="{FF2B5EF4-FFF2-40B4-BE49-F238E27FC236}">
+                <a16:creationId xmlns:a16="http://schemas.microsoft.com/office/drawing/2014/main" id="{D87F076D-DEBB-47C8-86D1-5BC6366B4749}"/>
+              </a:ext>
+            </a:extLst>
+          </p:cNvPr>
+          <p:cNvPicPr>
+            <a:picLocks noChangeAspect="1"/>
+          </p:cNvPicPr>
+          <p:nvPr/>
+        </p:nvPicPr>
+        <p:blipFill>
+          <a:blip r:embed="rId2">
+            <a:extLst>
+              <a:ext uri="{28A0092B-C50C-407E-A947-70E740481C1C}">
+                <a14:useLocalDpi xmlns:a14="http://schemas.microsoft.com/office/drawing/2010/main" val="0"/>
+              </a:ext>
+            </a:extLst>
+          </a:blip>
+          <a:stretch>
+            <a:fillRect/>
+          </a:stretch>
+        </p:blipFill>
+        <p:spPr>
+          <a:xfrm>
+            <a:off x="0" y="0"/>
+            <a:ext cx="7531875" cy="3646762"/>
+          </a:xfrm>
+          <a:prstGeom prst="rect">
+            <a:avLst/>
+          </a:prstGeom>
+          <a:ln w="12700">
+            <a:solidFill>
+              <a:schemeClr val="tx1"/>
+            </a:solidFill>
+          </a:ln>
+        </p:spPr>
+      </p:pic>
+      <p:pic>
+        <p:nvPicPr>
+          <p:cNvPr id="2" name="Picture 1">
+            <a:extLst>
+              <a:ext uri="{FF2B5EF4-FFF2-40B4-BE49-F238E27FC236}">
+                <a16:creationId xmlns:a16="http://schemas.microsoft.com/office/drawing/2014/main" id="{02C0D20A-B45A-4746-8CDF-086B0D444846}"/>
+              </a:ext>
+            </a:extLst>
+          </p:cNvPr>
+          <p:cNvPicPr>
+            <a:picLocks noChangeAspect="1"/>
+          </p:cNvPicPr>
+          <p:nvPr/>
+        </p:nvPicPr>
+        <p:blipFill>
+          <a:blip r:embed="rId3">
+            <a:extLst>
+              <a:ext uri="{28A0092B-C50C-407E-A947-70E740481C1C}">
+                <a14:useLocalDpi xmlns:a14="http://schemas.microsoft.com/office/drawing/2010/main" val="0"/>
+              </a:ext>
+            </a:extLst>
+          </a:blip>
+          <a:stretch>
+            <a:fillRect/>
+          </a:stretch>
+        </p:blipFill>
+        <p:spPr>
+          <a:xfrm>
+            <a:off x="4252714" y="3027098"/>
+            <a:ext cx="7939286" cy="3830902"/>
+          </a:xfrm>
+          <a:prstGeom prst="rect">
+            <a:avLst/>
+          </a:prstGeom>
+          <a:ln w="12700">
+            <a:solidFill>
+              <a:schemeClr val="tx1"/>
+            </a:solidFill>
+          </a:ln>
+        </p:spPr>
+      </p:pic>
+      <p:sp>
+        <p:nvSpPr>
+          <p:cNvPr id="4" name="Arrow: Bent 3">
+            <a:extLst>
+              <a:ext uri="{FF2B5EF4-FFF2-40B4-BE49-F238E27FC236}">
+                <a16:creationId xmlns:a16="http://schemas.microsoft.com/office/drawing/2014/main" id="{35891D20-AA30-4DAA-8339-720C7055D1A3}"/>
+              </a:ext>
+            </a:extLst>
+          </p:cNvPr>
+          <p:cNvSpPr/>
+          <p:nvPr/>
+        </p:nvSpPr>
+        <p:spPr>
+          <a:xfrm flipV="1">
+            <a:off x="1314450" y="3709331"/>
+            <a:ext cx="2804914" cy="1543050"/>
+          </a:xfrm>
+          <a:prstGeom prst="bentArrow">
+            <a:avLst>
+              <a:gd name="adj1" fmla="val 25000"/>
+              <a:gd name="adj2" fmla="val 26543"/>
+              <a:gd name="adj3" fmla="val 25000"/>
+              <a:gd name="adj4" fmla="val 43750"/>
+            </a:avLst>
+          </a:prstGeom>
+          <a:solidFill>
+            <a:schemeClr val="tx1"/>
+          </a:solidFill>
+        </p:spPr>
+        <p:style>
+          <a:lnRef idx="2">
+            <a:schemeClr val="accent1">
+              <a:shade val="50000"/>
+            </a:schemeClr>
+          </a:lnRef>
+          <a:fillRef idx="1">
+            <a:schemeClr val="accent1"/>
+          </a:fillRef>
+          <a:effectRef idx="0">
+            <a:schemeClr val="accent1"/>
+          </a:effectRef>
+          <a:fontRef idx="minor">
+            <a:schemeClr val="lt1"/>
+          </a:fontRef>
+        </p:style>
+        <p:txBody>
+          <a:bodyPr rtlCol="0" anchor="ctr"/>
+          <a:lstStyle/>
+          <a:p>
+            <a:pPr algn="ctr"/>
+            <a:endParaRPr lang="en-US">
+              <a:solidFill>
+                <a:schemeClr val="tx1"/>
+              </a:solidFill>
+            </a:endParaRPr>
+          </a:p>
+        </p:txBody>
+      </p:sp>
+      <p:sp>
+        <p:nvSpPr>
+          <p:cNvPr id="5" name="TextBox 4">
+            <a:extLst>
+              <a:ext uri="{FF2B5EF4-FFF2-40B4-BE49-F238E27FC236}">
+                <a16:creationId xmlns:a16="http://schemas.microsoft.com/office/drawing/2014/main" id="{8E1A1BF7-FDC1-4262-8C85-C2DFCF39CD21}"/>
+              </a:ext>
+            </a:extLst>
+          </p:cNvPr>
+          <p:cNvSpPr txBox="1"/>
+          <p:nvPr/>
+        </p:nvSpPr>
+        <p:spPr>
+          <a:xfrm>
+            <a:off x="663251" y="5416227"/>
+            <a:ext cx="3068994" cy="923330"/>
+          </a:xfrm>
+          <a:prstGeom prst="rect">
+            <a:avLst/>
+          </a:prstGeom>
+          <a:noFill/>
+        </p:spPr>
+        <p:txBody>
+          <a:bodyPr wrap="square" rtlCol="0">
+            <a:spAutoFit/>
+          </a:bodyPr>
+          <a:lstStyle/>
+          <a:p>
+            <a:r>
+              <a:rPr lang="en-US" dirty="0"/>
+              <a:t>Figures 10 &amp; 11: Application before (upper left) and after (lower right) form submission</a:t>
             </a:r>
           </a:p>
         </p:txBody>
@@ -4671,7 +5004,7 @@
     </p:spTree>
     <p:extLst>
       <p:ext uri="{BB962C8B-B14F-4D97-AF65-F5344CB8AC3E}">
-        <p14:creationId xmlns:p14="http://schemas.microsoft.com/office/powerpoint/2010/main" val="1484384226"/>
+        <p14:creationId xmlns:p14="http://schemas.microsoft.com/office/powerpoint/2010/main" val="2206245502"/>
       </p:ext>
     </p:extLst>
   </p:cSld>
@@ -4775,6 +5108,17 @@
               <a:rPr lang="en-US" dirty="0"/>
               <a:t> applications, and would have been used to conduct unit testing</a:t>
             </a:r>
+          </a:p>
+          <a:p>
+            <a:r>
+              <a:rPr lang="en-US" dirty="0"/>
+              <a:t>There are also a number of Python testing libraries available to test the Python scripts in a more robust manner, for example </a:t>
+            </a:r>
+            <a:r>
+              <a:rPr lang="en-US" dirty="0" err="1"/>
+              <a:t>Pytest</a:t>
+            </a:r>
+            <a:endParaRPr lang="en-US" dirty="0"/>
           </a:p>
         </p:txBody>
       </p:sp>
@@ -4854,7 +5198,9 @@
         </p:nvSpPr>
         <p:spPr/>
         <p:txBody>
-          <a:bodyPr/>
+          <a:bodyPr>
+            <a:normAutofit lnSpcReduction="10000"/>
+          </a:bodyPr>
           <a:lstStyle/>
           <a:p>
             <a:r>
@@ -4889,10 +5235,36 @@
             </a:r>
           </a:p>
           <a:p>
+            <a:pPr lvl="2"/>
+            <a:r>
+              <a:rPr lang="en-US" dirty="0"/>
+              <a:t>Type matchup, checks &amp; counter highlights within Pokémon ranking pane, </a:t>
+            </a:r>
+            <a:r>
+              <a:rPr lang="en-US" dirty="0" err="1"/>
+              <a:t>etc</a:t>
+            </a:r>
+            <a:endParaRPr lang="en-US" dirty="0"/>
+          </a:p>
+          <a:p>
             <a:pPr lvl="1"/>
             <a:r>
               <a:rPr lang="en-US" dirty="0"/>
               <a:t>Using cookies to persist user sessions</a:t>
+            </a:r>
+          </a:p>
+          <a:p>
+            <a:pPr lvl="1"/>
+            <a:r>
+              <a:rPr lang="en-US" dirty="0"/>
+              <a:t>Enable browsing of usage stats in table format</a:t>
+            </a:r>
+          </a:p>
+          <a:p>
+            <a:pPr lvl="1"/>
+            <a:r>
+              <a:rPr lang="en-US" dirty="0"/>
+              <a:t>Speed up querying by bundling async requests to complete faster</a:t>
             </a:r>
           </a:p>
         </p:txBody>
@@ -4945,7 +5317,7 @@
         </p:nvSpPr>
         <p:spPr>
           <a:xfrm>
-            <a:off x="838200" y="1996701"/>
+            <a:off x="838200" y="2766218"/>
             <a:ext cx="10515600" cy="1325563"/>
           </a:xfrm>
         </p:spPr>
@@ -5038,7 +5410,7 @@
         <p:spPr/>
         <p:txBody>
           <a:bodyPr>
-            <a:normAutofit fontScale="92500"/>
+            <a:normAutofit lnSpcReduction="10000"/>
           </a:bodyPr>
           <a:lstStyle/>
           <a:p>
@@ -5050,31 +5422,25 @@
           <a:p>
             <a:r>
               <a:rPr lang="en-US" dirty="0"/>
+              <a:t>Aims to explore development process of selecting, implementing and developing with a chosen technology stack</a:t>
+            </a:r>
+          </a:p>
+          <a:p>
+            <a:r>
+              <a:rPr lang="en-US" dirty="0"/>
               <a:t>There are many frameworks and tech stacks to choose from</a:t>
             </a:r>
           </a:p>
           <a:p>
             <a:r>
               <a:rPr lang="en-US" dirty="0"/>
-              <a:t>Familiarity with one framework can translate to others, in the same way familiarity with one programming can be used to learn others</a:t>
-            </a:r>
-          </a:p>
-          <a:p>
-            <a:r>
-              <a:rPr lang="en-US" dirty="0"/>
-              <a:t>In previous professional experience, systems were often married to a single database solution, rather than using them to compliment each other</a:t>
-            </a:r>
-          </a:p>
-          <a:p>
-            <a:r>
-              <a:rPr lang="en-US" dirty="0"/>
-              <a:t>Issues can arise with having to maintain two separate and different DBMS</a:t>
-            </a:r>
-          </a:p>
-          <a:p>
-            <a:r>
-              <a:rPr lang="en-US" dirty="0"/>
-              <a:t>Aims to explore development process of selecting, implementing and developing with a chosen technology stack</a:t>
+              <a:t>Familiarity with one framework can translate to others, in the same way familiarity with one programming language can be used to learn others</a:t>
+            </a:r>
+          </a:p>
+          <a:p>
+            <a:r>
+              <a:rPr lang="en-US" dirty="0"/>
+              <a:t>In previous professional experience, applications were often inflexibly married to a single database management system, rather than using different to compliment each other’s strengths and weaknesses</a:t>
             </a:r>
           </a:p>
         </p:txBody>
@@ -5161,7 +5527,7 @@
         </p:spPr>
         <p:txBody>
           <a:bodyPr>
-            <a:normAutofit fontScale="85000" lnSpcReduction="10000"/>
+            <a:normAutofit fontScale="85000" lnSpcReduction="20000"/>
           </a:bodyPr>
           <a:lstStyle/>
           <a:p>
@@ -5185,7 +5551,7 @@
           <a:p>
             <a:r>
               <a:rPr lang="en-US" dirty="0"/>
-              <a:t>Enable a functional server to connect database systems to web application</a:t>
+              <a:t>Enable a functional server with an API to connect database systems to web application</a:t>
             </a:r>
           </a:p>
           <a:p>
@@ -5460,19 +5826,19 @@
           <a:p>
             <a:r>
               <a:rPr lang="en-US" dirty="0"/>
-              <a:t>This project is an exploratory case study on the development of a web-based application using VueJS, MongoDB, Express, PostgreSQL and NodeJS.</a:t>
-            </a:r>
-          </a:p>
-          <a:p>
-            <a:r>
-              <a:rPr lang="en-US" dirty="0"/>
-              <a:t>By exploring end-to-end application development, this project aims to explore and understand best development practices, implementation of cyber security measures, API development and data storage in a potentially real-world application scenario.</a:t>
-            </a:r>
-          </a:p>
-          <a:p>
-            <a:r>
-              <a:rPr lang="en-US" dirty="0"/>
-              <a:t>This project also aims to understand the benefits of using SQL and NoSQL databases together to enable greater data storage and access flexibility.</a:t>
+              <a:t>This project is an exploratory case study on the development of a web-based application using VueJS, MongoDB, Express, PostgreSQL, Python and NodeJS</a:t>
+            </a:r>
+          </a:p>
+          <a:p>
+            <a:r>
+              <a:rPr lang="en-US" dirty="0"/>
+              <a:t>By exploring end-to-end application development, this project aims to explore and understand development best practices, implementation of cyber security measures, API development and data storage in a potentially real-world application scenario.</a:t>
+            </a:r>
+          </a:p>
+          <a:p>
+            <a:r>
+              <a:rPr lang="en-US" dirty="0"/>
+              <a:t>This project also aims to understand the benefits of using SQL and NoSQL databases together to enable greater data storage flexibility.</a:t>
             </a:r>
           </a:p>
         </p:txBody>
@@ -6397,18 +6763,6 @@
               <a:t> (such as JSX for React or TypeScript for Angular). </a:t>
             </a:r>
           </a:p>
-          <a:p>
-            <a:r>
-              <a:rPr lang="en-US" dirty="0"/>
-              <a:t>Vue separates its applications into components, which allows for clear separation of responsibility</a:t>
-            </a:r>
-          </a:p>
-          <a:p>
-            <a:r>
-              <a:rPr lang="en-US" dirty="0"/>
-              <a:t>A very lightweight yet robust framework</a:t>
-            </a:r>
-          </a:p>
         </p:txBody>
       </p:sp>
     </p:spTree>
@@ -6488,19 +6842,19 @@
         <p:spPr/>
         <p:txBody>
           <a:bodyPr>
-            <a:normAutofit fontScale="92500" lnSpcReduction="10000"/>
+            <a:normAutofit fontScale="85000" lnSpcReduction="20000"/>
           </a:bodyPr>
           <a:lstStyle/>
           <a:p>
             <a:r>
               <a:rPr lang="en-US" dirty="0"/>
-              <a:t>Vue sits between React and Angular, as the three most popular MVC JavaScript frameworks. React and Vue are both lightweight and utilize a virtual DOM, which reduces load times.</a:t>
-            </a:r>
-          </a:p>
-          <a:p>
-            <a:r>
-              <a:rPr lang="en-US" dirty="0"/>
-              <a:t>Vue uses hot module reloading (HMR) to quickly parse the DOM tree and only makes changes where changes are made, rather than reloading the entire DOM tree, as is the case in Angular</a:t>
+              <a:t>Vue sits between React and Angular, as the three currently most popular MVC JavaScript frameworks. React and Vue are both lightweight and utilize a virtual DOM, which reduces loading and refresh time.</a:t>
+            </a:r>
+          </a:p>
+          <a:p>
+            <a:r>
+              <a:rPr lang="en-US" dirty="0"/>
+              <a:t>Vue uses hot module reloading (HMR) to quickly parse the DOM tree only where changes are made, rather than reloading the entire DOM tree, as is the case in Angular</a:t>
             </a:r>
           </a:p>
           <a:p>
@@ -6512,7 +6866,7 @@
           <a:p>
             <a:r>
               <a:rPr lang="en-US" dirty="0"/>
-              <a:t>Personal preference for the Vue development ecosystem over React or Angular; Angular uses TypeScript, which is similar to JavaScript, but not; </a:t>
+              <a:t>Personal preference for the Vue development ecosystem over React or Angular; Angular uses TypeScript, which is similar to JavaScript; </a:t>
             </a:r>
             <a:r>
               <a:rPr lang="en-US" dirty="0" err="1"/>
@@ -6520,8 +6874,26 @@
             </a:r>
             <a:r>
               <a:rPr lang="en-US" dirty="0"/>
-              <a:t> way of creating components feels less smooth compared to Vue</a:t>
-            </a:r>
+              <a:t> way of creating components feels less intuitive compared to Vue</a:t>
+            </a:r>
+          </a:p>
+          <a:p>
+            <a:r>
+              <a:rPr lang="en-US" dirty="0"/>
+              <a:t>Vue separates its applications into components, which allows for clear separation of responsibility</a:t>
+            </a:r>
+          </a:p>
+          <a:p>
+            <a:r>
+              <a:rPr lang="en-US" dirty="0"/>
+              <a:t>A very lightweight yet robust framework</a:t>
+            </a:r>
+          </a:p>
+          <a:p>
+            <a:endParaRPr lang="en-US" dirty="0"/>
+          </a:p>
+          <a:p>
+            <a:endParaRPr lang="en-US" dirty="0"/>
           </a:p>
         </p:txBody>
       </p:sp>

</xml_diff>